<commit_message>
Added content of today's session at Experts Live on Tour
</commit_message>
<xml_diff>
--- a/ExpertsLive2016-05-11/Module.1.-.PowerShell.fundamentals.pptx
+++ b/ExpertsLive2016-05-11/Module.1.-.PowerShell.fundamentals.pptx
@@ -225,7 +225,7 @@
           <a:p>
             <a:fld id="{3E82F302-A7C8-034E-97BB-FC8263E03487}" type="datetimeFigureOut">
               <a:rPr lang="en-US" smtClean="0"/>
-              <a:t>2016-02-17</a:t>
+              <a:t>2016-05-11</a:t>
             </a:fld>
             <a:endParaRPr lang="en-US"/>
           </a:p>
@@ -2886,8 +2886,12 @@
           <a:lstStyle/>
           <a:p>
             <a:r>
+              <a:rPr lang="nl-NL" dirty="0" err="1" smtClean="0"/>
+              <a:t>PowerShell</a:t>
+            </a:r>
+            <a:r>
               <a:rPr lang="nl-NL" dirty="0" smtClean="0"/>
-              <a:t>Windows Server and PowerShell</a:t>
+              <a:t> Fundamentals</a:t>
             </a:r>
             <a:endParaRPr lang="nl-NL" dirty="0"/>
           </a:p>
@@ -2911,8 +2915,12 @@
           <a:lstStyle/>
           <a:p>
             <a:r>
+              <a:rPr lang="nl-NL" smtClean="0"/>
+              <a:t>Jaap </a:t>
+            </a:r>
+            <a:r>
               <a:rPr lang="nl-NL" dirty="0" smtClean="0"/>
-              <a:t>Bert Wolters &amp; Jaap Brasser</a:t>
+              <a:t>Brasser</a:t>
             </a:r>
             <a:endParaRPr lang="nl-NL" dirty="0"/>
           </a:p>

</xml_diff>